<commit_message>
Updated CSS Strategy PowerPoint slide
</commit_message>
<xml_diff>
--- a/EX 1/Start  - CSS STRATEGY.pptx
+++ b/EX 1/Start  - CSS STRATEGY.pptx
@@ -8,6 +8,7 @@
     <p:sldId id="256" r:id="rId2"/>
     <p:sldId id="258" r:id="rId3"/>
     <p:sldId id="257" r:id="rId4"/>
+    <p:sldId id="259" r:id="rId5"/>
   </p:sldIdLst>
   <p:sldSz cx="12192000" cy="6858000"/>
   <p:notesSz cx="6858000" cy="9144000"/>
@@ -106,6 +107,11 @@
       </a:defRPr>
     </a:lvl9pPr>
   </p:defaultTextStyle>
+  <p:extLst>
+    <p:ext uri="{EFAFB233-063F-42B5-8137-9DF3F51BA10A}">
+      <p15:sldGuideLst xmlns:p15="http://schemas.microsoft.com/office/powerpoint/2012/main"/>
+    </p:ext>
+  </p:extLst>
 </p:presentation>
 </file>
 
@@ -256,7 +262,7 @@
           <a:p>
             <a:fld id="{C0FAEE99-BDB4-4A2A-B2E9-74B86D049DCB}" type="datetimeFigureOut">
               <a:rPr lang="en-US" smtClean="0"/>
-              <a:t>8/4/2024</a:t>
+              <a:t>11/5/2025</a:t>
             </a:fld>
             <a:endParaRPr lang="en-US"/>
           </a:p>
@@ -454,7 +460,7 @@
           <a:p>
             <a:fld id="{C0FAEE99-BDB4-4A2A-B2E9-74B86D049DCB}" type="datetimeFigureOut">
               <a:rPr lang="en-US" smtClean="0"/>
-              <a:t>8/4/2024</a:t>
+              <a:t>11/5/2025</a:t>
             </a:fld>
             <a:endParaRPr lang="en-US"/>
           </a:p>
@@ -662,7 +668,7 @@
           <a:p>
             <a:fld id="{C0FAEE99-BDB4-4A2A-B2E9-74B86D049DCB}" type="datetimeFigureOut">
               <a:rPr lang="en-US" smtClean="0"/>
-              <a:t>8/4/2024</a:t>
+              <a:t>11/5/2025</a:t>
             </a:fld>
             <a:endParaRPr lang="en-US"/>
           </a:p>
@@ -860,7 +866,7 @@
           <a:p>
             <a:fld id="{C0FAEE99-BDB4-4A2A-B2E9-74B86D049DCB}" type="datetimeFigureOut">
               <a:rPr lang="en-US" smtClean="0"/>
-              <a:t>8/4/2024</a:t>
+              <a:t>11/5/2025</a:t>
             </a:fld>
             <a:endParaRPr lang="en-US"/>
           </a:p>
@@ -1135,7 +1141,7 @@
           <a:p>
             <a:fld id="{C0FAEE99-BDB4-4A2A-B2E9-74B86D049DCB}" type="datetimeFigureOut">
               <a:rPr lang="en-US" smtClean="0"/>
-              <a:t>8/4/2024</a:t>
+              <a:t>11/5/2025</a:t>
             </a:fld>
             <a:endParaRPr lang="en-US"/>
           </a:p>
@@ -1400,7 +1406,7 @@
           <a:p>
             <a:fld id="{C0FAEE99-BDB4-4A2A-B2E9-74B86D049DCB}" type="datetimeFigureOut">
               <a:rPr lang="en-US" smtClean="0"/>
-              <a:t>8/4/2024</a:t>
+              <a:t>11/5/2025</a:t>
             </a:fld>
             <a:endParaRPr lang="en-US"/>
           </a:p>
@@ -1812,7 +1818,7 @@
           <a:p>
             <a:fld id="{C0FAEE99-BDB4-4A2A-B2E9-74B86D049DCB}" type="datetimeFigureOut">
               <a:rPr lang="en-US" smtClean="0"/>
-              <a:t>8/4/2024</a:t>
+              <a:t>11/5/2025</a:t>
             </a:fld>
             <a:endParaRPr lang="en-US"/>
           </a:p>
@@ -1953,7 +1959,7 @@
           <a:p>
             <a:fld id="{C0FAEE99-BDB4-4A2A-B2E9-74B86D049DCB}" type="datetimeFigureOut">
               <a:rPr lang="en-US" smtClean="0"/>
-              <a:t>8/4/2024</a:t>
+              <a:t>11/5/2025</a:t>
             </a:fld>
             <a:endParaRPr lang="en-US"/>
           </a:p>
@@ -2066,7 +2072,7 @@
           <a:p>
             <a:fld id="{C0FAEE99-BDB4-4A2A-B2E9-74B86D049DCB}" type="datetimeFigureOut">
               <a:rPr lang="en-US" smtClean="0"/>
-              <a:t>8/4/2024</a:t>
+              <a:t>11/5/2025</a:t>
             </a:fld>
             <a:endParaRPr lang="en-US"/>
           </a:p>
@@ -2377,7 +2383,7 @@
           <a:p>
             <a:fld id="{C0FAEE99-BDB4-4A2A-B2E9-74B86D049DCB}" type="datetimeFigureOut">
               <a:rPr lang="en-US" smtClean="0"/>
-              <a:t>8/4/2024</a:t>
+              <a:t>11/5/2025</a:t>
             </a:fld>
             <a:endParaRPr lang="en-US"/>
           </a:p>
@@ -2665,7 +2671,7 @@
           <a:p>
             <a:fld id="{C0FAEE99-BDB4-4A2A-B2E9-74B86D049DCB}" type="datetimeFigureOut">
               <a:rPr lang="en-US" smtClean="0"/>
-              <a:t>8/4/2024</a:t>
+              <a:t>11/5/2025</a:t>
             </a:fld>
             <a:endParaRPr lang="en-US"/>
           </a:p>
@@ -2906,7 +2912,7 @@
           <a:p>
             <a:fld id="{C0FAEE99-BDB4-4A2A-B2E9-74B86D049DCB}" type="datetimeFigureOut">
               <a:rPr lang="en-US" smtClean="0"/>
-              <a:t>8/4/2024</a:t>
+              <a:t>11/5/2025</a:t>
             </a:fld>
             <a:endParaRPr lang="en-US"/>
           </a:p>
@@ -4073,8 +4079,8 @@
         </p:nvSpPr>
         <p:spPr>
           <a:xfrm>
-            <a:off x="509359" y="664278"/>
-            <a:ext cx="1618841" cy="369332"/>
+            <a:off x="1372882" y="221069"/>
+            <a:ext cx="2950808" cy="923330"/>
           </a:xfrm>
           <a:prstGeom prst="rect">
             <a:avLst/>
@@ -4087,9 +4093,98 @@
           </a:bodyPr>
           <a:lstStyle/>
           <a:p>
+            <a:pPr marL="285750" indent="-285750">
+              <a:buFontTx/>
+              <a:buChar char="-"/>
+            </a:pPr>
             <a:r>
               <a:rPr lang="en-US" dirty="0"/>
-              <a:t>- Height: 100vh</a:t>
+              <a:t>Height: 100vh</a:t>
+            </a:r>
+          </a:p>
+          <a:p>
+            <a:pPr marL="285750" indent="-285750">
+              <a:buFontTx/>
+              <a:buChar char="-"/>
+            </a:pPr>
+            <a:r>
+              <a:rPr lang="en-US" dirty="0"/>
+              <a:t>Container name: .root-div</a:t>
+            </a:r>
+          </a:p>
+          <a:p>
+            <a:pPr marL="285750" indent="-285750">
+              <a:buFontTx/>
+              <a:buChar char="-"/>
+            </a:pPr>
+            <a:r>
+              <a:rPr lang="en-US" dirty="0"/>
+              <a:t>Flex Direction : column</a:t>
+            </a:r>
+          </a:p>
+        </p:txBody>
+      </p:sp>
+      <p:sp>
+        <p:nvSpPr>
+          <p:cNvPr id="20" name="TextBox 19">
+            <a:extLst>
+              <a:ext uri="{FF2B5EF4-FFF2-40B4-BE49-F238E27FC236}">
+                <a16:creationId xmlns:a16="http://schemas.microsoft.com/office/drawing/2014/main" id="{CACFAFF2-C572-8925-3475-8A77D4445DD1}"/>
+              </a:ext>
+            </a:extLst>
+          </p:cNvPr>
+          <p:cNvSpPr txBox="1"/>
+          <p:nvPr/>
+        </p:nvSpPr>
+        <p:spPr>
+          <a:xfrm>
+            <a:off x="4718038" y="29774"/>
+            <a:ext cx="6101080" cy="1200329"/>
+          </a:xfrm>
+          <a:prstGeom prst="rect">
+            <a:avLst/>
+          </a:prstGeom>
+          <a:noFill/>
+        </p:spPr>
+        <p:txBody>
+          <a:bodyPr wrap="square">
+            <a:spAutoFit/>
+          </a:bodyPr>
+          <a:lstStyle/>
+          <a:p>
+            <a:r>
+              <a:rPr lang="en-US" dirty="0"/>
+              <a:t>Children</a:t>
+            </a:r>
+          </a:p>
+          <a:p>
+            <a:pPr marL="285750" indent="-285750">
+              <a:buFontTx/>
+              <a:buChar char="-"/>
+            </a:pPr>
+            <a:r>
+              <a:rPr lang="en-US" dirty="0"/>
+              <a:t>.nav</a:t>
+            </a:r>
+          </a:p>
+          <a:p>
+            <a:pPr marL="285750" indent="-285750">
+              <a:buFontTx/>
+              <a:buChar char="-"/>
+            </a:pPr>
+            <a:r>
+              <a:rPr lang="en-US" dirty="0"/>
+              <a:t>.header</a:t>
+            </a:r>
+          </a:p>
+          <a:p>
+            <a:pPr marL="285750" indent="-285750">
+              <a:buFontTx/>
+              <a:buChar char="-"/>
+            </a:pPr>
+            <a:r>
+              <a:rPr lang="en-US" dirty="0"/>
+              <a:t>.content</a:t>
             </a:r>
           </a:p>
         </p:txBody>
@@ -4124,10 +4219,561 @@
           <a:chExt cx="0" cy="0"/>
         </a:xfrm>
       </p:grpSpPr>
+      <p:sp>
+        <p:nvSpPr>
+          <p:cNvPr id="3" name="TextBox 2">
+            <a:extLst>
+              <a:ext uri="{FF2B5EF4-FFF2-40B4-BE49-F238E27FC236}">
+                <a16:creationId xmlns:a16="http://schemas.microsoft.com/office/drawing/2014/main" id="{D4ED8DB5-36AB-7876-7E22-205D29DDBA22}"/>
+              </a:ext>
+            </a:extLst>
+          </p:cNvPr>
+          <p:cNvSpPr txBox="1"/>
+          <p:nvPr/>
+        </p:nvSpPr>
+        <p:spPr>
+          <a:xfrm>
+            <a:off x="555585" y="625033"/>
+            <a:ext cx="2484206" cy="1477328"/>
+          </a:xfrm>
+          <a:prstGeom prst="rect">
+            <a:avLst/>
+          </a:prstGeom>
+          <a:noFill/>
+        </p:spPr>
+        <p:txBody>
+          <a:bodyPr wrap="none" rtlCol="0">
+            <a:spAutoFit/>
+          </a:bodyPr>
+          <a:lstStyle/>
+          <a:p>
+            <a:r>
+              <a:rPr lang="en-US" dirty="0"/>
+              <a:t>1.  nav Container</a:t>
+            </a:r>
+          </a:p>
+          <a:p>
+            <a:pPr marL="285750" indent="-285750">
+              <a:buFontTx/>
+              <a:buChar char="-"/>
+            </a:pPr>
+            <a:r>
+              <a:rPr lang="en-US" dirty="0"/>
+              <a:t>Container name: .nav</a:t>
+            </a:r>
+          </a:p>
+          <a:p>
+            <a:pPr marL="285750" indent="-285750">
+              <a:buFontTx/>
+              <a:buChar char="-"/>
+            </a:pPr>
+            <a:r>
+              <a:rPr lang="en-US" dirty="0"/>
+              <a:t>flex: 0</a:t>
+            </a:r>
+          </a:p>
+          <a:p>
+            <a:pPr marL="285750" indent="-285750">
+              <a:buFontTx/>
+              <a:buChar char="-"/>
+            </a:pPr>
+            <a:r>
+              <a:rPr lang="en-US" dirty="0"/>
+              <a:t>Flex direction: row</a:t>
+            </a:r>
+          </a:p>
+          <a:p>
+            <a:endParaRPr lang="en-US" dirty="0"/>
+          </a:p>
+        </p:txBody>
+      </p:sp>
+      <p:sp>
+        <p:nvSpPr>
+          <p:cNvPr id="5" name="TextBox 4">
+            <a:extLst>
+              <a:ext uri="{FF2B5EF4-FFF2-40B4-BE49-F238E27FC236}">
+                <a16:creationId xmlns:a16="http://schemas.microsoft.com/office/drawing/2014/main" id="{6DEBB9E4-0108-9692-6B13-6CB6A6759100}"/>
+              </a:ext>
+            </a:extLst>
+          </p:cNvPr>
+          <p:cNvSpPr txBox="1"/>
+          <p:nvPr/>
+        </p:nvSpPr>
+        <p:spPr>
+          <a:xfrm>
+            <a:off x="1524000" y="2102361"/>
+            <a:ext cx="6096000" cy="1200329"/>
+          </a:xfrm>
+          <a:prstGeom prst="rect">
+            <a:avLst/>
+          </a:prstGeom>
+          <a:noFill/>
+        </p:spPr>
+        <p:txBody>
+          <a:bodyPr wrap="square">
+            <a:spAutoFit/>
+          </a:bodyPr>
+          <a:lstStyle/>
+          <a:p>
+            <a:r>
+              <a:rPr lang="en-US" dirty="0"/>
+              <a:t>Children</a:t>
+            </a:r>
+          </a:p>
+          <a:p>
+            <a:pPr marL="285750" indent="-285750">
+              <a:buFontTx/>
+              <a:buChar char="-"/>
+            </a:pPr>
+            <a:r>
+              <a:rPr lang="en-US" dirty="0"/>
+              <a:t>.logo</a:t>
+            </a:r>
+          </a:p>
+          <a:p>
+            <a:pPr marL="285750" indent="-285750">
+              <a:buFontTx/>
+              <a:buChar char="-"/>
+            </a:pPr>
+            <a:r>
+              <a:rPr lang="en-US" dirty="0"/>
+              <a:t>.menu</a:t>
+            </a:r>
+          </a:p>
+          <a:p>
+            <a:pPr marL="285750" indent="-285750">
+              <a:buFontTx/>
+              <a:buChar char="-"/>
+            </a:pPr>
+            <a:r>
+              <a:rPr lang="en-US" dirty="0"/>
+              <a:t>.profile</a:t>
+            </a:r>
+          </a:p>
+        </p:txBody>
+      </p:sp>
+      <p:sp>
+        <p:nvSpPr>
+          <p:cNvPr id="7" name="TextBox 6">
+            <a:extLst>
+              <a:ext uri="{FF2B5EF4-FFF2-40B4-BE49-F238E27FC236}">
+                <a16:creationId xmlns:a16="http://schemas.microsoft.com/office/drawing/2014/main" id="{95F6B601-BE72-581F-3F55-153408BD1715}"/>
+              </a:ext>
+            </a:extLst>
+          </p:cNvPr>
+          <p:cNvSpPr txBox="1"/>
+          <p:nvPr/>
+        </p:nvSpPr>
+        <p:spPr>
+          <a:xfrm>
+            <a:off x="629920" y="3579689"/>
+            <a:ext cx="5572760" cy="1477328"/>
+          </a:xfrm>
+          <a:prstGeom prst="rect">
+            <a:avLst/>
+          </a:prstGeom>
+          <a:noFill/>
+        </p:spPr>
+        <p:txBody>
+          <a:bodyPr wrap="square" rtlCol="0">
+            <a:spAutoFit/>
+          </a:bodyPr>
+          <a:lstStyle/>
+          <a:p>
+            <a:r>
+              <a:rPr lang="en-US" dirty="0"/>
+              <a:t>2. Header section</a:t>
+            </a:r>
+          </a:p>
+          <a:p>
+            <a:pPr marL="285750" indent="-285750">
+              <a:buFontTx/>
+              <a:buChar char="-"/>
+            </a:pPr>
+            <a:r>
+              <a:rPr lang="en-US" dirty="0"/>
+              <a:t>Container Name: .header</a:t>
+            </a:r>
+          </a:p>
+          <a:p>
+            <a:pPr marL="285750" indent="-285750">
+              <a:buFontTx/>
+              <a:buChar char="-"/>
+            </a:pPr>
+            <a:r>
+              <a:rPr lang="en-US" dirty="0"/>
+              <a:t>flex: 0</a:t>
+            </a:r>
+          </a:p>
+          <a:p>
+            <a:pPr marL="285750" indent="-285750">
+              <a:buFontTx/>
+              <a:buChar char="-"/>
+            </a:pPr>
+            <a:r>
+              <a:rPr lang="en-US" dirty="0"/>
+              <a:t>Flex direction: row</a:t>
+            </a:r>
+          </a:p>
+          <a:p>
+            <a:pPr marL="285750" indent="-285750">
+              <a:buFontTx/>
+              <a:buChar char="-"/>
+            </a:pPr>
+            <a:endParaRPr lang="en-US" dirty="0"/>
+          </a:p>
+        </p:txBody>
+      </p:sp>
+      <p:sp>
+        <p:nvSpPr>
+          <p:cNvPr id="10" name="TextBox 9">
+            <a:extLst>
+              <a:ext uri="{FF2B5EF4-FFF2-40B4-BE49-F238E27FC236}">
+                <a16:creationId xmlns:a16="http://schemas.microsoft.com/office/drawing/2014/main" id="{4294F7EA-105D-C093-786B-78834F595E39}"/>
+              </a:ext>
+            </a:extLst>
+          </p:cNvPr>
+          <p:cNvSpPr txBox="1"/>
+          <p:nvPr/>
+        </p:nvSpPr>
+        <p:spPr>
+          <a:xfrm>
+            <a:off x="1524000" y="5134238"/>
+            <a:ext cx="6096000" cy="1200329"/>
+          </a:xfrm>
+          <a:prstGeom prst="rect">
+            <a:avLst/>
+          </a:prstGeom>
+          <a:noFill/>
+        </p:spPr>
+        <p:txBody>
+          <a:bodyPr wrap="square">
+            <a:spAutoFit/>
+          </a:bodyPr>
+          <a:lstStyle/>
+          <a:p>
+            <a:r>
+              <a:rPr lang="en-US" dirty="0"/>
+              <a:t>Children</a:t>
+            </a:r>
+          </a:p>
+          <a:p>
+            <a:pPr marL="285750" indent="-285750">
+              <a:buFontTx/>
+              <a:buChar char="-"/>
+            </a:pPr>
+            <a:r>
+              <a:rPr lang="en-US" dirty="0"/>
+              <a:t>.title</a:t>
+            </a:r>
+          </a:p>
+          <a:p>
+            <a:pPr marL="285750" indent="-285750">
+              <a:buFontTx/>
+              <a:buChar char="-"/>
+            </a:pPr>
+            <a:r>
+              <a:rPr lang="en-US" dirty="0"/>
+              <a:t>.filter</a:t>
+            </a:r>
+          </a:p>
+          <a:p>
+            <a:pPr marL="285750" indent="-285750">
+              <a:buFontTx/>
+              <a:buChar char="-"/>
+            </a:pPr>
+            <a:r>
+              <a:rPr lang="en-US" dirty="0"/>
+              <a:t>.buttons</a:t>
+            </a:r>
+          </a:p>
+        </p:txBody>
+      </p:sp>
     </p:spTree>
     <p:extLst>
       <p:ext uri="{BB962C8B-B14F-4D97-AF65-F5344CB8AC3E}">
         <p14:creationId xmlns:p14="http://schemas.microsoft.com/office/powerpoint/2010/main" val="535099321"/>
+      </p:ext>
+    </p:extLst>
+  </p:cSld>
+  <p:clrMapOvr>
+    <a:masterClrMapping/>
+  </p:clrMapOvr>
+</p:sld>
+</file>
+
+<file path=ppt/slides/slide4.xml><?xml version="1.0" encoding="utf-8"?>
+<p:sld xmlns:a="http://schemas.openxmlformats.org/drawingml/2006/main" xmlns:r="http://schemas.openxmlformats.org/officeDocument/2006/relationships" xmlns:p="http://schemas.openxmlformats.org/presentationml/2006/main">
+  <p:cSld>
+    <p:spTree>
+      <p:nvGrpSpPr>
+        <p:cNvPr id="1" name=""/>
+        <p:cNvGrpSpPr/>
+        <p:nvPr/>
+      </p:nvGrpSpPr>
+      <p:grpSpPr>
+        <a:xfrm>
+          <a:off x="0" y="0"/>
+          <a:ext cx="0" cy="0"/>
+          <a:chOff x="0" y="0"/>
+          <a:chExt cx="0" cy="0"/>
+        </a:xfrm>
+      </p:grpSpPr>
+      <p:sp>
+        <p:nvSpPr>
+          <p:cNvPr id="2" name="TextBox 1">
+            <a:extLst>
+              <a:ext uri="{FF2B5EF4-FFF2-40B4-BE49-F238E27FC236}">
+                <a16:creationId xmlns:a16="http://schemas.microsoft.com/office/drawing/2014/main" id="{75962C6D-6ACC-C9A0-C0ED-7970B6AA4E54}"/>
+              </a:ext>
+            </a:extLst>
+          </p:cNvPr>
+          <p:cNvSpPr txBox="1"/>
+          <p:nvPr/>
+        </p:nvSpPr>
+        <p:spPr>
+          <a:xfrm>
+            <a:off x="437985" y="402203"/>
+            <a:ext cx="3426350" cy="1200329"/>
+          </a:xfrm>
+          <a:prstGeom prst="rect">
+            <a:avLst/>
+          </a:prstGeom>
+          <a:noFill/>
+        </p:spPr>
+        <p:txBody>
+          <a:bodyPr wrap="square" rtlCol="0">
+            <a:spAutoFit/>
+          </a:bodyPr>
+          <a:lstStyle/>
+          <a:p>
+            <a:r>
+              <a:rPr lang="en-US" dirty="0"/>
+              <a:t>3. Main content area</a:t>
+            </a:r>
+          </a:p>
+          <a:p>
+            <a:pPr marL="285750" indent="-285750">
+              <a:buFontTx/>
+              <a:buChar char="-"/>
+            </a:pPr>
+            <a:r>
+              <a:rPr lang="en-US" dirty="0"/>
+              <a:t>Container name: .content</a:t>
+            </a:r>
+          </a:p>
+          <a:p>
+            <a:pPr marL="285750" indent="-285750">
+              <a:buFontTx/>
+              <a:buChar char="-"/>
+            </a:pPr>
+            <a:r>
+              <a:rPr lang="en-US" dirty="0"/>
+              <a:t>flex: 1</a:t>
+            </a:r>
+          </a:p>
+          <a:p>
+            <a:pPr marL="285750" indent="-285750">
+              <a:buFontTx/>
+              <a:buChar char="-"/>
+            </a:pPr>
+            <a:r>
+              <a:rPr lang="en-US" dirty="0"/>
+              <a:t>Flex direction: row</a:t>
+            </a:r>
+          </a:p>
+        </p:txBody>
+      </p:sp>
+      <p:sp>
+        <p:nvSpPr>
+          <p:cNvPr id="6" name="TextBox 5">
+            <a:extLst>
+              <a:ext uri="{FF2B5EF4-FFF2-40B4-BE49-F238E27FC236}">
+                <a16:creationId xmlns:a16="http://schemas.microsoft.com/office/drawing/2014/main" id="{A08139BA-3A16-3652-7509-059BFD3F1897}"/>
+              </a:ext>
+            </a:extLst>
+          </p:cNvPr>
+          <p:cNvSpPr txBox="1"/>
+          <p:nvPr/>
+        </p:nvSpPr>
+        <p:spPr>
+          <a:xfrm>
+            <a:off x="1498600" y="1746796"/>
+            <a:ext cx="6096000" cy="923330"/>
+          </a:xfrm>
+          <a:prstGeom prst="rect">
+            <a:avLst/>
+          </a:prstGeom>
+          <a:noFill/>
+        </p:spPr>
+        <p:txBody>
+          <a:bodyPr wrap="square">
+            <a:spAutoFit/>
+          </a:bodyPr>
+          <a:lstStyle/>
+          <a:p>
+            <a:r>
+              <a:rPr lang="en-US" dirty="0"/>
+              <a:t>Children</a:t>
+            </a:r>
+          </a:p>
+          <a:p>
+            <a:pPr marL="285750" indent="-285750">
+              <a:buFontTx/>
+              <a:buChar char="-"/>
+            </a:pPr>
+            <a:r>
+              <a:rPr lang="en-US" dirty="0"/>
+              <a:t>.sidebar</a:t>
+            </a:r>
+          </a:p>
+          <a:p>
+            <a:pPr marL="285750" indent="-285750">
+              <a:buFontTx/>
+              <a:buChar char="-"/>
+            </a:pPr>
+            <a:r>
+              <a:rPr lang="en-US" dirty="0"/>
+              <a:t>.main</a:t>
+            </a:r>
+          </a:p>
+        </p:txBody>
+      </p:sp>
+      <p:sp>
+        <p:nvSpPr>
+          <p:cNvPr id="8" name="TextBox 7">
+            <a:extLst>
+              <a:ext uri="{FF2B5EF4-FFF2-40B4-BE49-F238E27FC236}">
+                <a16:creationId xmlns:a16="http://schemas.microsoft.com/office/drawing/2014/main" id="{0EF50775-C4FA-585F-2664-8288615B2E0E}"/>
+              </a:ext>
+            </a:extLst>
+          </p:cNvPr>
+          <p:cNvSpPr txBox="1"/>
+          <p:nvPr/>
+        </p:nvSpPr>
+        <p:spPr>
+          <a:xfrm>
+            <a:off x="502920" y="2987546"/>
+            <a:ext cx="6096000" cy="1477328"/>
+          </a:xfrm>
+          <a:prstGeom prst="rect">
+            <a:avLst/>
+          </a:prstGeom>
+          <a:noFill/>
+        </p:spPr>
+        <p:txBody>
+          <a:bodyPr wrap="square">
+            <a:spAutoFit/>
+          </a:bodyPr>
+          <a:lstStyle/>
+          <a:p>
+            <a:pPr marL="285750" indent="-285750">
+              <a:buFont typeface="Arial" panose="020B0604020202020204" pitchFamily="34" charset="0"/>
+              <a:buChar char="•"/>
+            </a:pPr>
+            <a:r>
+              <a:rPr lang="en-US" dirty="0"/>
+              <a:t>Inside .main :</a:t>
+            </a:r>
+          </a:p>
+          <a:p>
+            <a:pPr marL="285750" indent="-285750">
+              <a:buFontTx/>
+              <a:buChar char="-"/>
+            </a:pPr>
+            <a:r>
+              <a:rPr lang="en-US" dirty="0"/>
+              <a:t>display: flex</a:t>
+            </a:r>
+          </a:p>
+          <a:p>
+            <a:pPr marL="285750" indent="-285750">
+              <a:buFontTx/>
+              <a:buChar char="-"/>
+            </a:pPr>
+            <a:r>
+              <a:rPr lang="en-US" dirty="0"/>
+              <a:t>Flex: 1</a:t>
+            </a:r>
+          </a:p>
+          <a:p>
+            <a:pPr marL="285750" indent="-285750">
+              <a:buFontTx/>
+              <a:buChar char="-"/>
+            </a:pPr>
+            <a:r>
+              <a:rPr lang="en-US" dirty="0"/>
+              <a:t>flex-wrap: wrap </a:t>
+            </a:r>
+          </a:p>
+          <a:p>
+            <a:pPr marL="285750" indent="-285750">
+              <a:buFontTx/>
+              <a:buChar char="-"/>
+            </a:pPr>
+            <a:r>
+              <a:rPr lang="en-US" dirty="0"/>
+              <a:t>justify-content: space-around</a:t>
+            </a:r>
+          </a:p>
+        </p:txBody>
+      </p:sp>
+      <p:sp>
+        <p:nvSpPr>
+          <p:cNvPr id="12" name="TextBox 11">
+            <a:extLst>
+              <a:ext uri="{FF2B5EF4-FFF2-40B4-BE49-F238E27FC236}">
+                <a16:creationId xmlns:a16="http://schemas.microsoft.com/office/drawing/2014/main" id="{7F836910-960C-C073-FD5C-1FEAD9624439}"/>
+              </a:ext>
+            </a:extLst>
+          </p:cNvPr>
+          <p:cNvSpPr txBox="1"/>
+          <p:nvPr/>
+        </p:nvSpPr>
+        <p:spPr>
+          <a:xfrm>
+            <a:off x="1498600" y="4782294"/>
+            <a:ext cx="6096000" cy="923330"/>
+          </a:xfrm>
+          <a:prstGeom prst="rect">
+            <a:avLst/>
+          </a:prstGeom>
+          <a:noFill/>
+        </p:spPr>
+        <p:txBody>
+          <a:bodyPr wrap="square">
+            <a:spAutoFit/>
+          </a:bodyPr>
+          <a:lstStyle/>
+          <a:p>
+            <a:r>
+              <a:rPr lang="en-US" dirty="0"/>
+              <a:t>Children:</a:t>
+            </a:r>
+          </a:p>
+          <a:p>
+            <a:pPr marL="285750" indent="-285750">
+              <a:buFontTx/>
+              <a:buChar char="-"/>
+            </a:pPr>
+            <a:r>
+              <a:rPr lang="en-US" dirty="0"/>
+              <a:t>.card (represents one class box or post</a:t>
+            </a:r>
+          </a:p>
+          <a:p>
+            <a:pPr marL="285750" indent="-285750">
+              <a:buFontTx/>
+              <a:buChar char="-"/>
+            </a:pPr>
+            <a:endParaRPr lang="en-US" dirty="0"/>
+          </a:p>
+        </p:txBody>
+      </p:sp>
+    </p:spTree>
+    <p:extLst>
+      <p:ext uri="{BB962C8B-B14F-4D97-AF65-F5344CB8AC3E}">
+        <p14:creationId xmlns:p14="http://schemas.microsoft.com/office/powerpoint/2010/main" val="3288041159"/>
       </p:ext>
     </p:extLst>
   </p:cSld>

</xml_diff>